<commit_message>
minor updates of the 20 min slides
</commit_message>
<xml_diff>
--- a/20min_introduction_slides/Introduction_to_scikit-rf.pptx
+++ b/20min_introduction_slides/Introduction_to_scikit-rf.pptx
@@ -226,7 +226,7 @@
           <a:p>
             <a:fld id="{12BE138C-1492-4745-AAED-205858D746B4}" type="datetimeFigureOut">
               <a:rPr lang="en-GB" smtClean="0"/>
-              <a:t>24/03/2022</a:t>
+              <a:t>28/05/2023</a:t>
             </a:fld>
             <a:endParaRPr lang="en-GB"/>
           </a:p>
@@ -6614,21 +6614,8 @@
             <a:pPr lvl="1"/>
             <a:r>
               <a:rPr lang="en-GB" dirty="0" smtClean="0"/>
-              <a:t>Deduce </a:t>
-            </a:r>
-            <a:r>
-              <a:rPr lang="en-GB" dirty="0" smtClean="0"/>
-              <a:t>statistical </a:t>
-            </a:r>
-            <a:r>
-              <a:rPr lang="en-GB" dirty="0" smtClean="0"/>
-              <a:t>properties (mean, standard-deviation, covariance, etc</a:t>
-            </a:r>
-            <a:r>
-              <a:rPr lang="en-GB" dirty="0" smtClean="0"/>
-              <a:t>.)</a:t>
-            </a:r>
-            <a:endParaRPr lang="en-GB" dirty="0" smtClean="0"/>
+              <a:t>Deduce statistical properties (mean, standard-deviation, covariance, etc.)</a:t>
+            </a:r>
           </a:p>
           <a:p>
             <a:pPr lvl="3"/>
@@ -13541,8 +13528,8 @@
         </p:blipFill>
         <p:spPr>
           <a:xfrm>
-            <a:off x="10291004" y="4349895"/>
-            <a:ext cx="1417553" cy="1827068"/>
+            <a:off x="10169237" y="3865474"/>
+            <a:ext cx="1932576" cy="2490875"/>
           </a:xfrm>
           <a:prstGeom prst="rect">
             <a:avLst/>
@@ -13827,7 +13814,6 @@
               <a:rPr lang="en-GB" sz="2400" dirty="0" smtClean="0"/>
               <a:t>The complete list of contributors can be seen here:</a:t>
             </a:r>
-            <a:endParaRPr lang="en-GB" sz="2400" dirty="0" smtClean="0"/>
           </a:p>
           <a:p>
             <a:r>
@@ -14331,7 +14317,15 @@
             <a:pPr lvl="2"/>
             <a:r>
               <a:rPr lang="en-GB" dirty="0" smtClean="0"/>
-              <a:t>By more than 50 volunteers on GitHub (</a:t>
+              <a:t>By more than </a:t>
+            </a:r>
+            <a:r>
+              <a:rPr lang="en-GB" dirty="0" smtClean="0"/>
+              <a:t>70 </a:t>
+            </a:r>
+            <a:r>
+              <a:rPr lang="en-GB" dirty="0" smtClean="0"/>
+              <a:t>volunteers on GitHub (</a:t>
             </a:r>
             <a:r>
               <a:rPr lang="en-GB" dirty="0" smtClean="0">
@@ -14341,8 +14335,9 @@
             </a:r>
             <a:r>
               <a:rPr lang="en-GB" dirty="0" smtClean="0"/>
-              <a:t>)  </a:t>
-            </a:r>
+              <a:t>), used in &gt; 170 projects  </a:t>
+            </a:r>
+            <a:endParaRPr lang="en-GB" dirty="0" smtClean="0"/>
           </a:p>
           <a:p>
             <a:pPr lvl="2"/>
@@ -14374,7 +14369,17 @@
               <a:rPr lang="en-GB" dirty="0" smtClean="0">
                 <a:hlinkClick r:id="rId3"/>
               </a:rPr>
-              <a:t>estimated 6 years of effort</a:t>
+              <a:t>estimated 6 years of </a:t>
+            </a:r>
+            <a:r>
+              <a:rPr lang="en-GB" dirty="0" smtClean="0">
+                <a:hlinkClick r:id="rId3"/>
+              </a:rPr>
+              <a:t>effort</a:t>
+            </a:r>
+            <a:r>
+              <a:rPr lang="en-GB" dirty="0" smtClean="0"/>
+              <a:t> (and counting)</a:t>
             </a:r>
             <a:endParaRPr lang="en-GB" dirty="0" smtClean="0"/>
           </a:p>
@@ -14429,30 +14434,6 @@
           </a:p>
         </p:txBody>
       </p:sp>
-      <p:pic>
-        <p:nvPicPr>
-          <p:cNvPr id="10" name="Image 9"/>
-          <p:cNvPicPr>
-            <a:picLocks noChangeAspect="1"/>
-          </p:cNvPicPr>
-          <p:nvPr/>
-        </p:nvPicPr>
-        <p:blipFill>
-          <a:blip r:embed="rId4"/>
-          <a:stretch>
-            <a:fillRect/>
-          </a:stretch>
-        </p:blipFill>
-        <p:spPr>
-          <a:xfrm>
-            <a:off x="188634" y="4217505"/>
-            <a:ext cx="4258674" cy="2640495"/>
-          </a:xfrm>
-          <a:prstGeom prst="rect">
-            <a:avLst/>
-          </a:prstGeom>
-        </p:spPr>
-      </p:pic>
       <p:pic>
         <p:nvPicPr>
           <p:cNvPr id="14" name="Image 13"/>
@@ -14462,7 +14443,7 @@
           <p:nvPr/>
         </p:nvPicPr>
         <p:blipFill>
-          <a:blip r:embed="rId5"/>
+          <a:blip r:embed="rId4"/>
           <a:stretch>
             <a:fillRect/>
           </a:stretch>
@@ -14477,6 +14458,68 @@
           </a:prstGeom>
         </p:spPr>
       </p:pic>
+      <p:pic>
+        <p:nvPicPr>
+          <p:cNvPr id="2" name="Image 1"/>
+          <p:cNvPicPr>
+            <a:picLocks noChangeAspect="1"/>
+          </p:cNvPicPr>
+          <p:nvPr/>
+        </p:nvPicPr>
+        <p:blipFill>
+          <a:blip r:embed="rId5"/>
+          <a:stretch>
+            <a:fillRect/>
+          </a:stretch>
+        </p:blipFill>
+        <p:spPr>
+          <a:xfrm>
+            <a:off x="-113615" y="4108466"/>
+            <a:ext cx="4608975" cy="2755631"/>
+          </a:xfrm>
+          <a:prstGeom prst="rect">
+            <a:avLst/>
+          </a:prstGeom>
+        </p:spPr>
+      </p:pic>
+      <p:sp>
+        <p:nvSpPr>
+          <p:cNvPr id="3" name="Flèche droite 2"/>
+          <p:cNvSpPr/>
+          <p:nvPr/>
+        </p:nvSpPr>
+        <p:spPr>
+          <a:xfrm rot="20681401">
+            <a:off x="950890" y="5005999"/>
+            <a:ext cx="2479963" cy="346364"/>
+          </a:xfrm>
+          <a:prstGeom prst="rightArrow">
+            <a:avLst/>
+          </a:prstGeom>
+        </p:spPr>
+        <p:style>
+          <a:lnRef idx="1">
+            <a:schemeClr val="accent1"/>
+          </a:lnRef>
+          <a:fillRef idx="2">
+            <a:schemeClr val="accent1"/>
+          </a:fillRef>
+          <a:effectRef idx="1">
+            <a:schemeClr val="accent1"/>
+          </a:effectRef>
+          <a:fontRef idx="minor">
+            <a:schemeClr val="dk1"/>
+          </a:fontRef>
+        </p:style>
+        <p:txBody>
+          <a:bodyPr rtlCol="0" anchor="ctr"/>
+          <a:lstStyle/>
+          <a:p>
+            <a:pPr algn="ctr"/>
+            <a:endParaRPr lang="en-GB"/>
+          </a:p>
+        </p:txBody>
+      </p:sp>
     </p:spTree>
     <p:extLst>
       <p:ext uri="{BB962C8B-B14F-4D97-AF65-F5344CB8AC3E}">

</xml_diff>